<commit_message>
modified:   doc/fig.pptx new file:   doc/sim_ds_design.asta
</commit_message>
<xml_diff>
--- a/doc/fig.pptx
+++ b/doc/fig.pptx
@@ -289,7 +289,7 @@
           <a:p>
             <a:fld id="{D45CD2D3-F377-4F0D-8DDB-F6916D460F71}" type="datetimeFigureOut">
               <a:rPr kumimoji="1" lang="ja-JP" altLang="en-US" smtClean="0"/>
-              <a:t>2014/11/12</a:t>
+              <a:t>2014/11/13</a:t>
             </a:fld>
             <a:endParaRPr kumimoji="1" lang="ja-JP" altLang="en-US"/>
           </a:p>
@@ -491,7 +491,7 @@
           <a:p>
             <a:fld id="{D45CD2D3-F377-4F0D-8DDB-F6916D460F71}" type="datetimeFigureOut">
               <a:rPr kumimoji="1" lang="ja-JP" altLang="en-US" smtClean="0"/>
-              <a:t>2014/11/12</a:t>
+              <a:t>2014/11/13</a:t>
             </a:fld>
             <a:endParaRPr kumimoji="1" lang="ja-JP" altLang="en-US"/>
           </a:p>
@@ -703,7 +703,7 @@
           <a:p>
             <a:fld id="{D45CD2D3-F377-4F0D-8DDB-F6916D460F71}" type="datetimeFigureOut">
               <a:rPr kumimoji="1" lang="ja-JP" altLang="en-US" smtClean="0"/>
-              <a:t>2014/11/12</a:t>
+              <a:t>2014/11/13</a:t>
             </a:fld>
             <a:endParaRPr kumimoji="1" lang="ja-JP" altLang="en-US"/>
           </a:p>
@@ -905,7 +905,7 @@
           <a:p>
             <a:fld id="{D45CD2D3-F377-4F0D-8DDB-F6916D460F71}" type="datetimeFigureOut">
               <a:rPr kumimoji="1" lang="ja-JP" altLang="en-US" smtClean="0"/>
-              <a:t>2014/11/12</a:t>
+              <a:t>2014/11/13</a:t>
             </a:fld>
             <a:endParaRPr kumimoji="1" lang="ja-JP" altLang="en-US"/>
           </a:p>
@@ -1151,7 +1151,7 @@
           <a:p>
             <a:fld id="{D45CD2D3-F377-4F0D-8DDB-F6916D460F71}" type="datetimeFigureOut">
               <a:rPr kumimoji="1" lang="ja-JP" altLang="en-US" smtClean="0"/>
-              <a:t>2014/11/12</a:t>
+              <a:t>2014/11/13</a:t>
             </a:fld>
             <a:endParaRPr kumimoji="1" lang="ja-JP" altLang="en-US"/>
           </a:p>
@@ -1503,7 +1503,7 @@
           <a:p>
             <a:fld id="{D45CD2D3-F377-4F0D-8DDB-F6916D460F71}" type="datetimeFigureOut">
               <a:rPr kumimoji="1" lang="ja-JP" altLang="en-US" smtClean="0"/>
-              <a:t>2014/11/12</a:t>
+              <a:t>2014/11/13</a:t>
             </a:fld>
             <a:endParaRPr kumimoji="1" lang="ja-JP" altLang="en-US"/>
           </a:p>
@@ -1989,7 +1989,7 @@
           <a:p>
             <a:fld id="{D45CD2D3-F377-4F0D-8DDB-F6916D460F71}" type="datetimeFigureOut">
               <a:rPr kumimoji="1" lang="ja-JP" altLang="en-US" smtClean="0"/>
-              <a:t>2014/11/12</a:t>
+              <a:t>2014/11/13</a:t>
             </a:fld>
             <a:endParaRPr kumimoji="1" lang="ja-JP" altLang="en-US"/>
           </a:p>
@@ -2107,7 +2107,7 @@
           <a:p>
             <a:fld id="{D45CD2D3-F377-4F0D-8DDB-F6916D460F71}" type="datetimeFigureOut">
               <a:rPr kumimoji="1" lang="ja-JP" altLang="en-US" smtClean="0"/>
-              <a:t>2014/11/12</a:t>
+              <a:t>2014/11/13</a:t>
             </a:fld>
             <a:endParaRPr kumimoji="1" lang="ja-JP" altLang="en-US"/>
           </a:p>
@@ -2202,7 +2202,7 @@
           <a:p>
             <a:fld id="{D45CD2D3-F377-4F0D-8DDB-F6916D460F71}" type="datetimeFigureOut">
               <a:rPr kumimoji="1" lang="ja-JP" altLang="en-US" smtClean="0"/>
-              <a:t>2014/11/12</a:t>
+              <a:t>2014/11/13</a:t>
             </a:fld>
             <a:endParaRPr kumimoji="1" lang="ja-JP" altLang="en-US"/>
           </a:p>
@@ -2511,7 +2511,7 @@
           <a:p>
             <a:fld id="{D45CD2D3-F377-4F0D-8DDB-F6916D460F71}" type="datetimeFigureOut">
               <a:rPr kumimoji="1" lang="ja-JP" altLang="en-US" smtClean="0"/>
-              <a:t>2014/11/12</a:t>
+              <a:t>2014/11/13</a:t>
             </a:fld>
             <a:endParaRPr kumimoji="1" lang="ja-JP" altLang="en-US"/>
           </a:p>
@@ -2764,7 +2764,7 @@
           <a:p>
             <a:fld id="{D45CD2D3-F377-4F0D-8DDB-F6916D460F71}" type="datetimeFigureOut">
               <a:rPr kumimoji="1" lang="ja-JP" altLang="en-US" smtClean="0"/>
-              <a:t>2014/11/12</a:t>
+              <a:t>2014/11/13</a:t>
             </a:fld>
             <a:endParaRPr kumimoji="1" lang="ja-JP" altLang="en-US"/>
           </a:p>
@@ -3009,7 +3009,7 @@
           <a:p>
             <a:fld id="{D45CD2D3-F377-4F0D-8DDB-F6916D460F71}" type="datetimeFigureOut">
               <a:rPr kumimoji="1" lang="ja-JP" altLang="en-US" smtClean="0"/>
-              <a:t>2014/11/12</a:t>
+              <a:t>2014/11/13</a:t>
             </a:fld>
             <a:endParaRPr kumimoji="1" lang="ja-JP" altLang="en-US"/>
           </a:p>
@@ -4197,14 +4197,6 @@
               </a:rPr>
               <a:t>route</a:t>
             </a:r>
-            <a:endParaRPr lang="en-US" altLang="ja-JP" sz="1000" dirty="0" smtClean="0">
-              <a:solidFill>
-                <a:schemeClr val="tx1">
-                  <a:lumMod val="75000"/>
-                  <a:lumOff val="25000"/>
-                </a:schemeClr>
-              </a:solidFill>
-            </a:endParaRPr>
           </a:p>
           <a:p>
             <a:pPr algn="ctr"/>
@@ -7267,14 +7259,6 @@
               </a:rPr>
               <a:t>route</a:t>
             </a:r>
-            <a:endParaRPr lang="en-US" altLang="ja-JP" sz="1000" dirty="0" smtClean="0">
-              <a:solidFill>
-                <a:schemeClr val="tx1">
-                  <a:lumMod val="75000"/>
-                  <a:lumOff val="25000"/>
-                </a:schemeClr>
-              </a:solidFill>
-            </a:endParaRPr>
           </a:p>
           <a:p>
             <a:pPr algn="ctr"/>

</xml_diff>